<commit_message>
After updating the slides
</commit_message>
<xml_diff>
--- a/UnderFive_Mortality_Presentation.pptx
+++ b/UnderFive_Mortality_Presentation.pptx
@@ -11,9 +11,10 @@
     <p:sldId id="259" r:id="rId5"/>
     <p:sldId id="260" r:id="rId6"/>
     <p:sldId id="263" r:id="rId7"/>
-    <p:sldId id="261" r:id="rId8"/>
-    <p:sldId id="262" r:id="rId9"/>
-    <p:sldId id="264" r:id="rId10"/>
+    <p:sldId id="265" r:id="rId8"/>
+    <p:sldId id="261" r:id="rId9"/>
+    <p:sldId id="262" r:id="rId10"/>
+    <p:sldId id="264" r:id="rId11"/>
   </p:sldIdLst>
   <p:sldSz cx="9144000" cy="6858000" type="screen4x3"/>
   <p:notesSz cx="6858000" cy="9144000"/>
@@ -410,7 +411,7 @@
           <a:p>
             <a:fld id="{5BCAD085-E8A6-8845-BD4E-CB4CCA059FC4}" type="datetimeFigureOut">
               <a:rPr lang="en-US" smtClean="0"/>
-              <a:t>12/28/2024</a:t>
+              <a:t>12/29/2024</a:t>
             </a:fld>
             <a:endParaRPr lang="en-US"/>
           </a:p>
@@ -842,7 +843,7 @@
           <a:p>
             <a:fld id="{5BCAD085-E8A6-8845-BD4E-CB4CCA059FC4}" type="datetimeFigureOut">
               <a:rPr lang="en-US" smtClean="0"/>
-              <a:t>12/28/2024</a:t>
+              <a:t>12/29/2024</a:t>
             </a:fld>
             <a:endParaRPr lang="en-US"/>
           </a:p>
@@ -1191,7 +1192,7 @@
           <a:p>
             <a:fld id="{5BCAD085-E8A6-8845-BD4E-CB4CCA059FC4}" type="datetimeFigureOut">
               <a:rPr lang="en-US" smtClean="0"/>
-              <a:t>12/28/2024</a:t>
+              <a:t>12/29/2024</a:t>
             </a:fld>
             <a:endParaRPr lang="en-US"/>
           </a:p>
@@ -1609,7 +1610,7 @@
           <a:p>
             <a:fld id="{5BCAD085-E8A6-8845-BD4E-CB4CCA059FC4}" type="datetimeFigureOut">
               <a:rPr lang="en-US" smtClean="0"/>
-              <a:t>12/28/2024</a:t>
+              <a:t>12/29/2024</a:t>
             </a:fld>
             <a:endParaRPr lang="en-US"/>
           </a:p>
@@ -2190,7 +2191,7 @@
           <a:p>
             <a:fld id="{5BCAD085-E8A6-8845-BD4E-CB4CCA059FC4}" type="datetimeFigureOut">
               <a:rPr lang="en-US" smtClean="0"/>
-              <a:t>12/28/2024</a:t>
+              <a:t>12/29/2024</a:t>
             </a:fld>
             <a:endParaRPr lang="en-US"/>
           </a:p>
@@ -2884,7 +2885,7 @@
           <a:p>
             <a:fld id="{5BCAD085-E8A6-8845-BD4E-CB4CCA059FC4}" type="datetimeFigureOut">
               <a:rPr lang="en-US" smtClean="0"/>
-              <a:t>12/28/2024</a:t>
+              <a:t>12/29/2024</a:t>
             </a:fld>
             <a:endParaRPr lang="en-US"/>
           </a:p>
@@ -3810,7 +3811,7 @@
           <a:p>
             <a:fld id="{5BCAD085-E8A6-8845-BD4E-CB4CCA059FC4}" type="datetimeFigureOut">
               <a:rPr lang="en-US" smtClean="0"/>
-              <a:t>12/28/2024</a:t>
+              <a:t>12/29/2024</a:t>
             </a:fld>
             <a:endParaRPr lang="en-US"/>
           </a:p>
@@ -4141,7 +4142,7 @@
           <a:p>
             <a:fld id="{5BCAD085-E8A6-8845-BD4E-CB4CCA059FC4}" type="datetimeFigureOut">
               <a:rPr lang="en-US" smtClean="0"/>
-              <a:t>12/28/2024</a:t>
+              <a:t>12/29/2024</a:t>
             </a:fld>
             <a:endParaRPr lang="en-US"/>
           </a:p>
@@ -4420,7 +4421,7 @@
           <a:p>
             <a:fld id="{5BCAD085-E8A6-8845-BD4E-CB4CCA059FC4}" type="datetimeFigureOut">
               <a:rPr lang="en-US" smtClean="0"/>
-              <a:t>12/28/2024</a:t>
+              <a:t>12/29/2024</a:t>
             </a:fld>
             <a:endParaRPr lang="en-US"/>
           </a:p>
@@ -4756,7 +4757,7 @@
           <a:p>
             <a:fld id="{5BCAD085-E8A6-8845-BD4E-CB4CCA059FC4}" type="datetimeFigureOut">
               <a:rPr lang="en-US" smtClean="0"/>
-              <a:t>12/28/2024</a:t>
+              <a:t>12/29/2024</a:t>
             </a:fld>
             <a:endParaRPr lang="en-US"/>
           </a:p>
@@ -5163,7 +5164,7 @@
           <a:p>
             <a:fld id="{5BCAD085-E8A6-8845-BD4E-CB4CCA059FC4}" type="datetimeFigureOut">
               <a:rPr lang="en-US" smtClean="0"/>
-              <a:t>12/28/2024</a:t>
+              <a:t>12/29/2024</a:t>
             </a:fld>
             <a:endParaRPr lang="en-US"/>
           </a:p>
@@ -5562,7 +5563,7 @@
           <a:p>
             <a:fld id="{5BCAD085-E8A6-8845-BD4E-CB4CCA059FC4}" type="datetimeFigureOut">
               <a:rPr lang="en-US" smtClean="0"/>
-              <a:t>12/28/2024</a:t>
+              <a:t>12/29/2024</a:t>
             </a:fld>
             <a:endParaRPr lang="en-US"/>
           </a:p>
@@ -6081,7 +6082,7 @@
           <a:p>
             <a:fld id="{5BCAD085-E8A6-8845-BD4E-CB4CCA059FC4}" type="datetimeFigureOut">
               <a:rPr lang="en-US" smtClean="0"/>
-              <a:t>12/28/2024</a:t>
+              <a:t>12/29/2024</a:t>
             </a:fld>
             <a:endParaRPr lang="en-US"/>
           </a:p>
@@ -6351,7 +6352,7 @@
           <a:p>
             <a:fld id="{5BCAD085-E8A6-8845-BD4E-CB4CCA059FC4}" type="datetimeFigureOut">
               <a:rPr lang="en-US" smtClean="0"/>
-              <a:t>12/28/2024</a:t>
+              <a:t>12/29/2024</a:t>
             </a:fld>
             <a:endParaRPr lang="en-US"/>
           </a:p>
@@ -6513,7 +6514,7 @@
           <a:p>
             <a:fld id="{5BCAD085-E8A6-8845-BD4E-CB4CCA059FC4}" type="datetimeFigureOut">
               <a:rPr lang="en-US" smtClean="0"/>
-              <a:t>12/28/2024</a:t>
+              <a:t>12/29/2024</a:t>
             </a:fld>
             <a:endParaRPr lang="en-US"/>
           </a:p>
@@ -6916,7 +6917,7 @@
           <a:p>
             <a:fld id="{5BCAD085-E8A6-8845-BD4E-CB4CCA059FC4}" type="datetimeFigureOut">
               <a:rPr lang="en-US" smtClean="0"/>
-              <a:t>12/28/2024</a:t>
+              <a:t>12/29/2024</a:t>
             </a:fld>
             <a:endParaRPr lang="en-US"/>
           </a:p>
@@ -7338,7 +7339,7 @@
           <a:p>
             <a:fld id="{5BCAD085-E8A6-8845-BD4E-CB4CCA059FC4}" type="datetimeFigureOut">
               <a:rPr lang="en-US" smtClean="0"/>
-              <a:t>12/28/2024</a:t>
+              <a:t>12/29/2024</a:t>
             </a:fld>
             <a:endParaRPr lang="en-US"/>
           </a:p>
@@ -7453,7 +7454,7 @@
           </a:prstGeom>
           <a:extLst>
             <a:ext uri="{909E8E84-426E-40dd-AFC4-6F175D3DCCD1}">
-              <a14:hiddenFill xmlns:a14="http://schemas.microsoft.com/office/drawing/2010/main" xmlns="">
+              <a14:hiddenFill xmlns="" xmlns:a14="http://schemas.microsoft.com/office/drawing/2010/main">
                 <a:solidFill>
                   <a:srgbClr val="FFFFFF"/>
                 </a:solidFill>
@@ -7592,7 +7593,7 @@
           <a:p>
             <a:fld id="{5BCAD085-E8A6-8845-BD4E-CB4CCA059FC4}" type="datetimeFigureOut">
               <a:rPr lang="en-US" smtClean="0"/>
-              <a:t>12/28/2024</a:t>
+              <a:t>12/29/2024</a:t>
             </a:fld>
             <a:endParaRPr lang="en-US"/>
           </a:p>
@@ -8086,685 +8087,7 @@
 </p:sld>
 </file>
 
-<file path=ppt/slides/slide2.xml><?xml version="1.0" encoding="utf-8"?>
-<p:sld xmlns:a="http://schemas.openxmlformats.org/drawingml/2006/main" xmlns:r="http://schemas.openxmlformats.org/officeDocument/2006/relationships" xmlns:p="http://schemas.openxmlformats.org/presentationml/2006/main">
-  <p:cSld>
-    <p:spTree>
-      <p:nvGrpSpPr>
-        <p:cNvPr id="1" name=""/>
-        <p:cNvGrpSpPr/>
-        <p:nvPr/>
-      </p:nvGrpSpPr>
-      <p:grpSpPr>
-        <a:xfrm>
-          <a:off x="0" y="0"/>
-          <a:ext cx="0" cy="0"/>
-          <a:chOff x="0" y="0"/>
-          <a:chExt cx="0" cy="0"/>
-        </a:xfrm>
-      </p:grpSpPr>
-      <p:sp>
-        <p:nvSpPr>
-          <p:cNvPr id="2" name="Title 1"/>
-          <p:cNvSpPr>
-            <a:spLocks noGrp="1"/>
-          </p:cNvSpPr>
-          <p:nvPr>
-            <p:ph type="title"/>
-          </p:nvPr>
-        </p:nvSpPr>
-        <p:spPr/>
-        <p:txBody>
-          <a:bodyPr/>
-          <a:lstStyle/>
-          <a:p>
-            <a:r>
-              <a:t>Introduction</a:t>
-            </a:r>
-          </a:p>
-        </p:txBody>
-      </p:sp>
-      <p:sp>
-        <p:nvSpPr>
-          <p:cNvPr id="3" name="Content Placeholder 2"/>
-          <p:cNvSpPr>
-            <a:spLocks noGrp="1"/>
-          </p:cNvSpPr>
-          <p:nvPr>
-            <p:ph idx="1"/>
-          </p:nvPr>
-        </p:nvSpPr>
-        <p:spPr/>
-        <p:txBody>
-          <a:bodyPr>
-            <a:normAutofit/>
-          </a:bodyPr>
-          <a:lstStyle/>
-          <a:p>
-            <a:r>
-              <a:rPr dirty="0"/>
-              <a:t>Analyze and predict under-five mortality rates per 1000 live births.</a:t>
-            </a:r>
-          </a:p>
-          <a:p>
-            <a:r>
-              <a:rPr dirty="0"/>
-              <a:t>Focus on neonatal challenges and early childhood diseases.</a:t>
-            </a:r>
-          </a:p>
-          <a:p>
-            <a:r>
-              <a:rPr dirty="0"/>
-              <a:t>High-risk regions: Sub-Saharan Africa and Southern Asia.</a:t>
-            </a:r>
-          </a:p>
-          <a:p>
-            <a:r>
-              <a:rPr dirty="0"/>
-              <a:t>Key causes: Preterm births, pneumonia, diarrhea, and malaria.</a:t>
-            </a:r>
-          </a:p>
-        </p:txBody>
-      </p:sp>
-    </p:spTree>
-  </p:cSld>
-  <p:clrMapOvr>
-    <a:masterClrMapping/>
-  </p:clrMapOvr>
-</p:sld>
-</file>
-
-<file path=ppt/slides/slide3.xml><?xml version="1.0" encoding="utf-8"?>
-<p:sld xmlns:a="http://schemas.openxmlformats.org/drawingml/2006/main" xmlns:r="http://schemas.openxmlformats.org/officeDocument/2006/relationships" xmlns:p="http://schemas.openxmlformats.org/presentationml/2006/main">
-  <p:cSld>
-    <p:spTree>
-      <p:nvGrpSpPr>
-        <p:cNvPr id="1" name=""/>
-        <p:cNvGrpSpPr/>
-        <p:nvPr/>
-      </p:nvGrpSpPr>
-      <p:grpSpPr>
-        <a:xfrm>
-          <a:off x="0" y="0"/>
-          <a:ext cx="0" cy="0"/>
-          <a:chOff x="0" y="0"/>
-          <a:chExt cx="0" cy="0"/>
-        </a:xfrm>
-      </p:grpSpPr>
-      <p:sp>
-        <p:nvSpPr>
-          <p:cNvPr id="2" name="Title 1"/>
-          <p:cNvSpPr>
-            <a:spLocks noGrp="1"/>
-          </p:cNvSpPr>
-          <p:nvPr>
-            <p:ph type="title"/>
-          </p:nvPr>
-        </p:nvSpPr>
-        <p:spPr/>
-        <p:txBody>
-          <a:bodyPr/>
-          <a:lstStyle/>
-          <a:p>
-            <a:r>
-              <a:t>Problem Statement</a:t>
-            </a:r>
-          </a:p>
-        </p:txBody>
-      </p:sp>
-      <p:sp>
-        <p:nvSpPr>
-          <p:cNvPr id="3" name="Content Placeholder 2"/>
-          <p:cNvSpPr>
-            <a:spLocks noGrp="1"/>
-          </p:cNvSpPr>
-          <p:nvPr>
-            <p:ph idx="1"/>
-          </p:nvPr>
-        </p:nvSpPr>
-        <p:spPr/>
-        <p:txBody>
-          <a:bodyPr/>
-          <a:lstStyle/>
-          <a:p>
-            <a:r>
-              <a:rPr dirty="0"/>
-              <a:t>Neonatal deaths account for 44% of under-five mortality.</a:t>
-            </a:r>
-          </a:p>
-          <a:p>
-            <a:r>
-              <a:rPr dirty="0"/>
-              <a:t>Main diseases: pneumonia, diarrhea, and malaria.</a:t>
-            </a:r>
-          </a:p>
-          <a:p>
-            <a:r>
-              <a:rPr dirty="0"/>
-              <a:t>Importance: Develop predictive models to guide healthcare interventions.</a:t>
-            </a:r>
-          </a:p>
-        </p:txBody>
-      </p:sp>
-    </p:spTree>
-  </p:cSld>
-  <p:clrMapOvr>
-    <a:masterClrMapping/>
-  </p:clrMapOvr>
-</p:sld>
-</file>
-
-<file path=ppt/slides/slide4.xml><?xml version="1.0" encoding="utf-8"?>
-<p:sld xmlns:a="http://schemas.openxmlformats.org/drawingml/2006/main" xmlns:r="http://schemas.openxmlformats.org/officeDocument/2006/relationships" xmlns:p="http://schemas.openxmlformats.org/presentationml/2006/main">
-  <p:cSld>
-    <p:spTree>
-      <p:nvGrpSpPr>
-        <p:cNvPr id="1" name=""/>
-        <p:cNvGrpSpPr/>
-        <p:nvPr/>
-      </p:nvGrpSpPr>
-      <p:grpSpPr>
-        <a:xfrm>
-          <a:off x="0" y="0"/>
-          <a:ext cx="0" cy="0"/>
-          <a:chOff x="0" y="0"/>
-          <a:chExt cx="0" cy="0"/>
-        </a:xfrm>
-      </p:grpSpPr>
-      <p:sp>
-        <p:nvSpPr>
-          <p:cNvPr id="2" name="Title 1"/>
-          <p:cNvSpPr>
-            <a:spLocks noGrp="1"/>
-          </p:cNvSpPr>
-          <p:nvPr>
-            <p:ph type="title"/>
-          </p:nvPr>
-        </p:nvSpPr>
-        <p:spPr/>
-        <p:txBody>
-          <a:bodyPr/>
-          <a:lstStyle/>
-          <a:p>
-            <a:r>
-              <a:rPr dirty="0"/>
-              <a:t>Study Review</a:t>
-            </a:r>
-          </a:p>
-        </p:txBody>
-      </p:sp>
-      <p:sp>
-        <p:nvSpPr>
-          <p:cNvPr id="3" name="Content Placeholder 2"/>
-          <p:cNvSpPr>
-            <a:spLocks noGrp="1"/>
-          </p:cNvSpPr>
-          <p:nvPr>
-            <p:ph idx="1"/>
-          </p:nvPr>
-        </p:nvSpPr>
-        <p:spPr/>
-        <p:txBody>
-          <a:bodyPr/>
-          <a:lstStyle/>
-          <a:p>
-            <a:r>
-              <a:rPr dirty="0"/>
-              <a:t>Machine Learning models used: Linear Regression, Decision Tree, Random Forest, K Neighbors.</a:t>
-            </a:r>
-          </a:p>
-          <a:p>
-            <a:r>
-              <a:rPr dirty="0"/>
-              <a:t>Random Forest outperforms others due to ensemble learning.</a:t>
-            </a:r>
-          </a:p>
-          <a:p>
-            <a:r>
-              <a:rPr dirty="0"/>
-              <a:t>Metrics: Mean Squared Error (MSE), Mean Absolute Error (MAE).</a:t>
-            </a:r>
-          </a:p>
-        </p:txBody>
-      </p:sp>
-    </p:spTree>
-  </p:cSld>
-  <p:clrMapOvr>
-    <a:masterClrMapping/>
-  </p:clrMapOvr>
-</p:sld>
-</file>
-
-<file path=ppt/slides/slide5.xml><?xml version="1.0" encoding="utf-8"?>
-<p:sld xmlns:a="http://schemas.openxmlformats.org/drawingml/2006/main" xmlns:r="http://schemas.openxmlformats.org/officeDocument/2006/relationships" xmlns:p="http://schemas.openxmlformats.org/presentationml/2006/main">
-  <p:cSld>
-    <p:spTree>
-      <p:nvGrpSpPr>
-        <p:cNvPr id="1" name=""/>
-        <p:cNvGrpSpPr/>
-        <p:nvPr/>
-      </p:nvGrpSpPr>
-      <p:grpSpPr>
-        <a:xfrm>
-          <a:off x="0" y="0"/>
-          <a:ext cx="0" cy="0"/>
-          <a:chOff x="0" y="0"/>
-          <a:chExt cx="0" cy="0"/>
-        </a:xfrm>
-      </p:grpSpPr>
-      <p:sp>
-        <p:nvSpPr>
-          <p:cNvPr id="2" name="Title 1"/>
-          <p:cNvSpPr>
-            <a:spLocks noGrp="1"/>
-          </p:cNvSpPr>
-          <p:nvPr>
-            <p:ph type="title"/>
-          </p:nvPr>
-        </p:nvSpPr>
-        <p:spPr/>
-        <p:txBody>
-          <a:bodyPr/>
-          <a:lstStyle/>
-          <a:p>
-            <a:r>
-              <a:t>Dataset Description</a:t>
-            </a:r>
-          </a:p>
-        </p:txBody>
-      </p:sp>
-      <p:sp>
-        <p:nvSpPr>
-          <p:cNvPr id="3" name="Content Placeholder 2"/>
-          <p:cNvSpPr>
-            <a:spLocks noGrp="1"/>
-          </p:cNvSpPr>
-          <p:nvPr>
-            <p:ph idx="1"/>
-          </p:nvPr>
-        </p:nvSpPr>
-        <p:spPr/>
-        <p:txBody>
-          <a:bodyPr/>
-          <a:lstStyle/>
-          <a:p>
-            <a:r>
-              <a:rPr dirty="0"/>
-              <a:t>Dataset Size: 31,465 rows, 6 features.</a:t>
-            </a:r>
-          </a:p>
-          <a:p>
-            <a:r>
-              <a:rPr dirty="0"/>
-              <a:t>Key Features: Country, Year, Birth Rates, Mortality Rates.</a:t>
-            </a:r>
-          </a:p>
-          <a:p>
-            <a:r>
-              <a:rPr dirty="0"/>
-              <a:t>Target: Mortality rate (per 1000 live births).</a:t>
-            </a:r>
-          </a:p>
-          <a:p>
-            <a:r>
-              <a:rPr dirty="0"/>
-              <a:t>Preprocessing: Encoding categorical data, normalizing numerical features.</a:t>
-            </a:r>
-          </a:p>
-        </p:txBody>
-      </p:sp>
-    </p:spTree>
-  </p:cSld>
-  <p:clrMapOvr>
-    <a:masterClrMapping/>
-  </p:clrMapOvr>
-</p:sld>
-</file>
-
-<file path=ppt/slides/slide6.xml><?xml version="1.0" encoding="utf-8"?>
-<p:sld xmlns:a="http://schemas.openxmlformats.org/drawingml/2006/main" xmlns:r="http://schemas.openxmlformats.org/officeDocument/2006/relationships" xmlns:p="http://schemas.openxmlformats.org/presentationml/2006/main">
-  <p:cSld>
-    <p:spTree>
-      <p:nvGrpSpPr>
-        <p:cNvPr id="1" name=""/>
-        <p:cNvGrpSpPr/>
-        <p:nvPr/>
-      </p:nvGrpSpPr>
-      <p:grpSpPr>
-        <a:xfrm>
-          <a:off x="0" y="0"/>
-          <a:ext cx="0" cy="0"/>
-          <a:chOff x="0" y="0"/>
-          <a:chExt cx="0" cy="0"/>
-        </a:xfrm>
-      </p:grpSpPr>
-      <p:sp>
-        <p:nvSpPr>
-          <p:cNvPr id="2" name="Title 1">
-            <a:extLst>
-              <a:ext uri="{FF2B5EF4-FFF2-40B4-BE49-F238E27FC236}">
-                <a16:creationId xmlns:a16="http://schemas.microsoft.com/office/drawing/2014/main" id="{7C06E619-80E9-725C-1583-FFDE7E783209}"/>
-              </a:ext>
-            </a:extLst>
-          </p:cNvPr>
-          <p:cNvSpPr>
-            <a:spLocks noGrp="1"/>
-          </p:cNvSpPr>
-          <p:nvPr>
-            <p:ph type="title"/>
-          </p:nvPr>
-        </p:nvSpPr>
-        <p:spPr/>
-        <p:txBody>
-          <a:bodyPr/>
-          <a:lstStyle/>
-          <a:p>
-            <a:r>
-              <a:rPr lang="en-US" dirty="0"/>
-              <a:t>Methodology</a:t>
-            </a:r>
-          </a:p>
-        </p:txBody>
-      </p:sp>
-      <p:sp>
-        <p:nvSpPr>
-          <p:cNvPr id="3" name="Content Placeholder 2">
-            <a:extLst>
-              <a:ext uri="{FF2B5EF4-FFF2-40B4-BE49-F238E27FC236}">
-                <a16:creationId xmlns:a16="http://schemas.microsoft.com/office/drawing/2014/main" id="{A334170B-BEE1-D1D5-C709-8F90609BC8FF}"/>
-              </a:ext>
-            </a:extLst>
-          </p:cNvPr>
-          <p:cNvSpPr>
-            <a:spLocks noGrp="1"/>
-          </p:cNvSpPr>
-          <p:nvPr>
-            <p:ph idx="1"/>
-          </p:nvPr>
-        </p:nvSpPr>
-        <p:spPr/>
-        <p:txBody>
-          <a:bodyPr/>
-          <a:lstStyle/>
-          <a:p>
-            <a:pPr marL="0" indent="0">
-              <a:buNone/>
-            </a:pPr>
-            <a:r>
-              <a:rPr lang="en-US" sz="2800" b="1" dirty="0"/>
-              <a:t>Steps:</a:t>
-            </a:r>
-          </a:p>
-          <a:p>
-            <a:pPr marL="0" indent="0">
-              <a:buNone/>
-            </a:pPr>
-            <a:r>
-              <a:rPr lang="en-US" sz="2000" dirty="0"/>
-              <a:t>1. Data Cleaning: Handling missing values and encoding.</a:t>
-            </a:r>
-          </a:p>
-          <a:p>
-            <a:pPr marL="0" indent="0">
-              <a:buNone/>
-            </a:pPr>
-            <a:r>
-              <a:rPr lang="en-US" sz="2000" dirty="0"/>
-              <a:t>2. Splitting Dataset: 80% training, 20% testing.</a:t>
-            </a:r>
-          </a:p>
-          <a:p>
-            <a:pPr marL="0" indent="0">
-              <a:buNone/>
-            </a:pPr>
-            <a:r>
-              <a:rPr lang="en-US" sz="2000" dirty="0"/>
-              <a:t>3. Applying Models: Linear Regression, Decision Tree, Random Forest, K Neighbors.</a:t>
-            </a:r>
-          </a:p>
-          <a:p>
-            <a:pPr marL="0" indent="0">
-              <a:buNone/>
-            </a:pPr>
-            <a:r>
-              <a:rPr lang="en-US" sz="2000" dirty="0"/>
-              <a:t>4. Evaluation: Using MSE and MAE to compare performance.</a:t>
-            </a:r>
-          </a:p>
-        </p:txBody>
-      </p:sp>
-    </p:spTree>
-    <p:extLst>
-      <p:ext uri="{BB962C8B-B14F-4D97-AF65-F5344CB8AC3E}">
-        <p14:creationId xmlns:p14="http://schemas.microsoft.com/office/powerpoint/2010/main" val="2129099590"/>
-      </p:ext>
-    </p:extLst>
-  </p:cSld>
-  <p:clrMapOvr>
-    <a:masterClrMapping/>
-  </p:clrMapOvr>
-</p:sld>
-</file>
-
-<file path=ppt/slides/slide7.xml><?xml version="1.0" encoding="utf-8"?>
-<p:sld xmlns:a="http://schemas.openxmlformats.org/drawingml/2006/main" xmlns:r="http://schemas.openxmlformats.org/officeDocument/2006/relationships" xmlns:p="http://schemas.openxmlformats.org/presentationml/2006/main">
-  <p:cSld>
-    <p:spTree>
-      <p:nvGrpSpPr>
-        <p:cNvPr id="1" name=""/>
-        <p:cNvGrpSpPr/>
-        <p:nvPr/>
-      </p:nvGrpSpPr>
-      <p:grpSpPr>
-        <a:xfrm>
-          <a:off x="0" y="0"/>
-          <a:ext cx="0" cy="0"/>
-          <a:chOff x="0" y="0"/>
-          <a:chExt cx="0" cy="0"/>
-        </a:xfrm>
-      </p:grpSpPr>
-      <p:sp>
-        <p:nvSpPr>
-          <p:cNvPr id="2" name="Title 1"/>
-          <p:cNvSpPr>
-            <a:spLocks noGrp="1"/>
-          </p:cNvSpPr>
-          <p:nvPr>
-            <p:ph type="title"/>
-          </p:nvPr>
-        </p:nvSpPr>
-        <p:spPr/>
-        <p:txBody>
-          <a:bodyPr/>
-          <a:lstStyle/>
-          <a:p>
-            <a:r>
-              <a:t>Results</a:t>
-            </a:r>
-          </a:p>
-        </p:txBody>
-      </p:sp>
-      <p:sp>
-        <p:nvSpPr>
-          <p:cNvPr id="3" name="Content Placeholder 2"/>
-          <p:cNvSpPr>
-            <a:spLocks noGrp="1"/>
-          </p:cNvSpPr>
-          <p:nvPr>
-            <p:ph idx="1"/>
-          </p:nvPr>
-        </p:nvSpPr>
-        <p:spPr/>
-        <p:txBody>
-          <a:bodyPr/>
-          <a:lstStyle/>
-          <a:p>
-            <a:pPr marL="0" indent="0">
-              <a:buNone/>
-            </a:pPr>
-            <a:r>
-              <a:rPr sz="2800" b="1" dirty="0"/>
-              <a:t>Model Performance (MAE):</a:t>
-            </a:r>
-          </a:p>
-          <a:p>
-            <a:r>
-              <a:rPr sz="2000" dirty="0"/>
-              <a:t>Linear Regression: 2137.19</a:t>
-            </a:r>
-          </a:p>
-          <a:p>
-            <a:r>
-              <a:rPr sz="2000" dirty="0"/>
-              <a:t>Random Forest: 182.01</a:t>
-            </a:r>
-          </a:p>
-          <a:p>
-            <a:r>
-              <a:rPr sz="2000" dirty="0"/>
-              <a:t>Decision Tree: 226.76</a:t>
-            </a:r>
-          </a:p>
-          <a:p>
-            <a:r>
-              <a:rPr sz="2000" dirty="0"/>
-              <a:t>K Neighbors: 211.85</a:t>
-            </a:r>
-            <a:endParaRPr lang="en-US" sz="2000" dirty="0"/>
-          </a:p>
-          <a:p>
-            <a:pPr marL="0" indent="0">
-              <a:buNone/>
-            </a:pPr>
-            <a:endParaRPr dirty="0"/>
-          </a:p>
-          <a:p>
-            <a:pPr marL="0" indent="0">
-              <a:buNone/>
-            </a:pPr>
-            <a:r>
-              <a:rPr lang="en-US" dirty="0"/>
-              <a:t>=&gt; </a:t>
-            </a:r>
-            <a:r>
-              <a:rPr dirty="0"/>
-              <a:t>Random Forest performed the best.</a:t>
-            </a:r>
-          </a:p>
-        </p:txBody>
-      </p:sp>
-    </p:spTree>
-  </p:cSld>
-  <p:clrMapOvr>
-    <a:masterClrMapping/>
-  </p:clrMapOvr>
-</p:sld>
-</file>
-
-<file path=ppt/slides/slide8.xml><?xml version="1.0" encoding="utf-8"?>
-<p:sld xmlns:a="http://schemas.openxmlformats.org/drawingml/2006/main" xmlns:r="http://schemas.openxmlformats.org/officeDocument/2006/relationships" xmlns:p="http://schemas.openxmlformats.org/presentationml/2006/main">
-  <p:cSld>
-    <p:spTree>
-      <p:nvGrpSpPr>
-        <p:cNvPr id="1" name=""/>
-        <p:cNvGrpSpPr/>
-        <p:nvPr/>
-      </p:nvGrpSpPr>
-      <p:grpSpPr>
-        <a:xfrm>
-          <a:off x="0" y="0"/>
-          <a:ext cx="0" cy="0"/>
-          <a:chOff x="0" y="0"/>
-          <a:chExt cx="0" cy="0"/>
-        </a:xfrm>
-      </p:grpSpPr>
-      <p:sp>
-        <p:nvSpPr>
-          <p:cNvPr id="2" name="Title 1"/>
-          <p:cNvSpPr>
-            <a:spLocks noGrp="1"/>
-          </p:cNvSpPr>
-          <p:nvPr>
-            <p:ph type="title"/>
-          </p:nvPr>
-        </p:nvSpPr>
-        <p:spPr/>
-        <p:txBody>
-          <a:bodyPr/>
-          <a:lstStyle/>
-          <a:p>
-            <a:r>
-              <a:t>Conclusion</a:t>
-            </a:r>
-          </a:p>
-        </p:txBody>
-      </p:sp>
-      <p:sp>
-        <p:nvSpPr>
-          <p:cNvPr id="3" name="Content Placeholder 2"/>
-          <p:cNvSpPr>
-            <a:spLocks noGrp="1"/>
-          </p:cNvSpPr>
-          <p:nvPr>
-            <p:ph idx="1"/>
-          </p:nvPr>
-        </p:nvSpPr>
-        <p:spPr/>
-        <p:txBody>
-          <a:bodyPr>
-            <a:normAutofit/>
-          </a:bodyPr>
-          <a:lstStyle/>
-          <a:p>
-            <a:r>
-              <a:rPr dirty="0"/>
-              <a:t>Random Forest is the most effective model with the lowest error.</a:t>
-            </a:r>
-          </a:p>
-          <a:p>
-            <a:r>
-              <a:rPr dirty="0"/>
-              <a:t>Neonatal deaths are the primary contributors to under-five mortality.</a:t>
-            </a:r>
-          </a:p>
-          <a:p>
-            <a:r>
-              <a:rPr dirty="0"/>
-              <a:t>Future Work:</a:t>
-            </a:r>
-          </a:p>
-          <a:p>
-            <a:pPr marL="914400" lvl="1" indent="-457200">
-              <a:buFont typeface="+mj-lt"/>
-              <a:buAutoNum type="arabicPeriod"/>
-            </a:pPr>
-            <a:r>
-              <a:rPr dirty="0"/>
-              <a:t>Add more features like healthcare access and education.</a:t>
-            </a:r>
-            <a:endParaRPr lang="en-US" dirty="0"/>
-          </a:p>
-          <a:p>
-            <a:pPr marL="914400" lvl="1" indent="-457200">
-              <a:buFont typeface="+mj-lt"/>
-              <a:buAutoNum type="arabicPeriod"/>
-            </a:pPr>
-            <a:r>
-              <a:rPr dirty="0"/>
-              <a:t>Explore deep learning techniques for further improvement.</a:t>
-            </a:r>
-          </a:p>
-        </p:txBody>
-      </p:sp>
-    </p:spTree>
-  </p:cSld>
-  <p:clrMapOvr>
-    <a:masterClrMapping/>
-  </p:clrMapOvr>
-</p:sld>
-</file>
-
-<file path=ppt/slides/slide9.xml><?xml version="1.0" encoding="utf-8"?>
+<file path=ppt/slides/slide10.xml><?xml version="1.0" encoding="utf-8"?>
 <p:sld xmlns:a="http://schemas.openxmlformats.org/drawingml/2006/main" xmlns:r="http://schemas.openxmlformats.org/officeDocument/2006/relationships" xmlns:p="http://schemas.openxmlformats.org/presentationml/2006/main" showMasterSp="0">
   <p:cSld>
     <p:bg>
@@ -8860,6 +8183,791 @@
         <p14:creationId xmlns:p14="http://schemas.microsoft.com/office/powerpoint/2010/main" val="1760761504"/>
       </p:ext>
     </p:extLst>
+  </p:cSld>
+  <p:clrMapOvr>
+    <a:masterClrMapping/>
+  </p:clrMapOvr>
+</p:sld>
+</file>
+
+<file path=ppt/slides/slide2.xml><?xml version="1.0" encoding="utf-8"?>
+<p:sld xmlns:a="http://schemas.openxmlformats.org/drawingml/2006/main" xmlns:r="http://schemas.openxmlformats.org/officeDocument/2006/relationships" xmlns:p="http://schemas.openxmlformats.org/presentationml/2006/main">
+  <p:cSld>
+    <p:spTree>
+      <p:nvGrpSpPr>
+        <p:cNvPr id="1" name=""/>
+        <p:cNvGrpSpPr/>
+        <p:nvPr/>
+      </p:nvGrpSpPr>
+      <p:grpSpPr>
+        <a:xfrm>
+          <a:off x="0" y="0"/>
+          <a:ext cx="0" cy="0"/>
+          <a:chOff x="0" y="0"/>
+          <a:chExt cx="0" cy="0"/>
+        </a:xfrm>
+      </p:grpSpPr>
+      <p:sp>
+        <p:nvSpPr>
+          <p:cNvPr id="2" name="Title 1"/>
+          <p:cNvSpPr>
+            <a:spLocks noGrp="1"/>
+          </p:cNvSpPr>
+          <p:nvPr>
+            <p:ph type="title"/>
+          </p:nvPr>
+        </p:nvSpPr>
+        <p:spPr/>
+        <p:txBody>
+          <a:bodyPr/>
+          <a:lstStyle/>
+          <a:p>
+            <a:r>
+              <a:t>Introduction</a:t>
+            </a:r>
+          </a:p>
+        </p:txBody>
+      </p:sp>
+      <p:sp>
+        <p:nvSpPr>
+          <p:cNvPr id="3" name="Content Placeholder 2"/>
+          <p:cNvSpPr>
+            <a:spLocks noGrp="1"/>
+          </p:cNvSpPr>
+          <p:nvPr>
+            <p:ph idx="1"/>
+          </p:nvPr>
+        </p:nvSpPr>
+        <p:spPr/>
+        <p:txBody>
+          <a:bodyPr>
+            <a:normAutofit/>
+          </a:bodyPr>
+          <a:lstStyle/>
+          <a:p>
+            <a:r>
+              <a:rPr dirty="0"/>
+              <a:t>Analyze and predict under-five mortality rates per 1000 live births.</a:t>
+            </a:r>
+          </a:p>
+          <a:p>
+            <a:r>
+              <a:rPr dirty="0"/>
+              <a:t>Focus on neonatal challenges and early childhood diseases.</a:t>
+            </a:r>
+          </a:p>
+          <a:p>
+            <a:r>
+              <a:rPr dirty="0"/>
+              <a:t>High-risk regions: Sub-Saharan Africa and Southern Asia.</a:t>
+            </a:r>
+          </a:p>
+          <a:p>
+            <a:r>
+              <a:rPr dirty="0"/>
+              <a:t>Key causes: Preterm births, pneumonia, diarrhea, and malaria.</a:t>
+            </a:r>
+          </a:p>
+        </p:txBody>
+      </p:sp>
+    </p:spTree>
+  </p:cSld>
+  <p:clrMapOvr>
+    <a:masterClrMapping/>
+  </p:clrMapOvr>
+</p:sld>
+</file>
+
+<file path=ppt/slides/slide3.xml><?xml version="1.0" encoding="utf-8"?>
+<p:sld xmlns:a="http://schemas.openxmlformats.org/drawingml/2006/main" xmlns:r="http://schemas.openxmlformats.org/officeDocument/2006/relationships" xmlns:p="http://schemas.openxmlformats.org/presentationml/2006/main">
+  <p:cSld>
+    <p:spTree>
+      <p:nvGrpSpPr>
+        <p:cNvPr id="1" name=""/>
+        <p:cNvGrpSpPr/>
+        <p:nvPr/>
+      </p:nvGrpSpPr>
+      <p:grpSpPr>
+        <a:xfrm>
+          <a:off x="0" y="0"/>
+          <a:ext cx="0" cy="0"/>
+          <a:chOff x="0" y="0"/>
+          <a:chExt cx="0" cy="0"/>
+        </a:xfrm>
+      </p:grpSpPr>
+      <p:sp>
+        <p:nvSpPr>
+          <p:cNvPr id="2" name="Title 1"/>
+          <p:cNvSpPr>
+            <a:spLocks noGrp="1"/>
+          </p:cNvSpPr>
+          <p:nvPr>
+            <p:ph type="title"/>
+          </p:nvPr>
+        </p:nvSpPr>
+        <p:spPr/>
+        <p:txBody>
+          <a:bodyPr/>
+          <a:lstStyle/>
+          <a:p>
+            <a:r>
+              <a:t>Problem Statement</a:t>
+            </a:r>
+          </a:p>
+        </p:txBody>
+      </p:sp>
+      <p:sp>
+        <p:nvSpPr>
+          <p:cNvPr id="3" name="Content Placeholder 2"/>
+          <p:cNvSpPr>
+            <a:spLocks noGrp="1"/>
+          </p:cNvSpPr>
+          <p:nvPr>
+            <p:ph idx="1"/>
+          </p:nvPr>
+        </p:nvSpPr>
+        <p:spPr/>
+        <p:txBody>
+          <a:bodyPr/>
+          <a:lstStyle/>
+          <a:p>
+            <a:r>
+              <a:rPr dirty="0"/>
+              <a:t>Neonatal deaths account for 44% of under-five mortality.</a:t>
+            </a:r>
+          </a:p>
+          <a:p>
+            <a:r>
+              <a:rPr dirty="0"/>
+              <a:t>Main diseases: pneumonia, diarrhea, and malaria.</a:t>
+            </a:r>
+          </a:p>
+          <a:p>
+            <a:r>
+              <a:rPr dirty="0"/>
+              <a:t>Importance: Develop predictive models to guide healthcare interventions.</a:t>
+            </a:r>
+          </a:p>
+        </p:txBody>
+      </p:sp>
+    </p:spTree>
+  </p:cSld>
+  <p:clrMapOvr>
+    <a:masterClrMapping/>
+  </p:clrMapOvr>
+</p:sld>
+</file>
+
+<file path=ppt/slides/slide4.xml><?xml version="1.0" encoding="utf-8"?>
+<p:sld xmlns:a="http://schemas.openxmlformats.org/drawingml/2006/main" xmlns:r="http://schemas.openxmlformats.org/officeDocument/2006/relationships" xmlns:p="http://schemas.openxmlformats.org/presentationml/2006/main">
+  <p:cSld>
+    <p:spTree>
+      <p:nvGrpSpPr>
+        <p:cNvPr id="1" name=""/>
+        <p:cNvGrpSpPr/>
+        <p:nvPr/>
+      </p:nvGrpSpPr>
+      <p:grpSpPr>
+        <a:xfrm>
+          <a:off x="0" y="0"/>
+          <a:ext cx="0" cy="0"/>
+          <a:chOff x="0" y="0"/>
+          <a:chExt cx="0" cy="0"/>
+        </a:xfrm>
+      </p:grpSpPr>
+      <p:sp>
+        <p:nvSpPr>
+          <p:cNvPr id="2" name="Title 1"/>
+          <p:cNvSpPr>
+            <a:spLocks noGrp="1"/>
+          </p:cNvSpPr>
+          <p:nvPr>
+            <p:ph type="title"/>
+          </p:nvPr>
+        </p:nvSpPr>
+        <p:spPr/>
+        <p:txBody>
+          <a:bodyPr/>
+          <a:lstStyle/>
+          <a:p>
+            <a:r>
+              <a:rPr dirty="0"/>
+              <a:t>Study Review</a:t>
+            </a:r>
+          </a:p>
+        </p:txBody>
+      </p:sp>
+      <p:sp>
+        <p:nvSpPr>
+          <p:cNvPr id="3" name="Content Placeholder 2"/>
+          <p:cNvSpPr>
+            <a:spLocks noGrp="1"/>
+          </p:cNvSpPr>
+          <p:nvPr>
+            <p:ph idx="1"/>
+          </p:nvPr>
+        </p:nvSpPr>
+        <p:spPr/>
+        <p:txBody>
+          <a:bodyPr/>
+          <a:lstStyle/>
+          <a:p>
+            <a:r>
+              <a:rPr dirty="0"/>
+              <a:t>Machine Learning models used: Linear Regression, Decision Tree, Random Forest, K Neighbors.</a:t>
+            </a:r>
+          </a:p>
+          <a:p>
+            <a:r>
+              <a:rPr dirty="0"/>
+              <a:t>Random Forest outperforms others due to ensemble learning.</a:t>
+            </a:r>
+          </a:p>
+          <a:p>
+            <a:r>
+              <a:rPr dirty="0"/>
+              <a:t>Metrics: Mean Squared Error (MSE), Mean Absolute Error (MAE).</a:t>
+            </a:r>
+          </a:p>
+        </p:txBody>
+      </p:sp>
+    </p:spTree>
+  </p:cSld>
+  <p:clrMapOvr>
+    <a:masterClrMapping/>
+  </p:clrMapOvr>
+</p:sld>
+</file>
+
+<file path=ppt/slides/slide5.xml><?xml version="1.0" encoding="utf-8"?>
+<p:sld xmlns:a="http://schemas.openxmlformats.org/drawingml/2006/main" xmlns:r="http://schemas.openxmlformats.org/officeDocument/2006/relationships" xmlns:p="http://schemas.openxmlformats.org/presentationml/2006/main">
+  <p:cSld>
+    <p:spTree>
+      <p:nvGrpSpPr>
+        <p:cNvPr id="1" name=""/>
+        <p:cNvGrpSpPr/>
+        <p:nvPr/>
+      </p:nvGrpSpPr>
+      <p:grpSpPr>
+        <a:xfrm>
+          <a:off x="0" y="0"/>
+          <a:ext cx="0" cy="0"/>
+          <a:chOff x="0" y="0"/>
+          <a:chExt cx="0" cy="0"/>
+        </a:xfrm>
+      </p:grpSpPr>
+      <p:sp>
+        <p:nvSpPr>
+          <p:cNvPr id="2" name="Title 1"/>
+          <p:cNvSpPr>
+            <a:spLocks noGrp="1"/>
+          </p:cNvSpPr>
+          <p:nvPr>
+            <p:ph type="title"/>
+          </p:nvPr>
+        </p:nvSpPr>
+        <p:spPr/>
+        <p:txBody>
+          <a:bodyPr/>
+          <a:lstStyle/>
+          <a:p>
+            <a:r>
+              <a:t>Dataset Description</a:t>
+            </a:r>
+          </a:p>
+        </p:txBody>
+      </p:sp>
+      <p:sp>
+        <p:nvSpPr>
+          <p:cNvPr id="3" name="Content Placeholder 2"/>
+          <p:cNvSpPr>
+            <a:spLocks noGrp="1"/>
+          </p:cNvSpPr>
+          <p:nvPr>
+            <p:ph idx="1"/>
+          </p:nvPr>
+        </p:nvSpPr>
+        <p:spPr/>
+        <p:txBody>
+          <a:bodyPr/>
+          <a:lstStyle/>
+          <a:p>
+            <a:r>
+              <a:rPr dirty="0"/>
+              <a:t>Dataset Size: 31,465 rows, 6 features.</a:t>
+            </a:r>
+          </a:p>
+          <a:p>
+            <a:r>
+              <a:rPr dirty="0"/>
+              <a:t>Key Features: Country, Year, Birth Rates, Mortality Rates.</a:t>
+            </a:r>
+          </a:p>
+          <a:p>
+            <a:r>
+              <a:rPr dirty="0"/>
+              <a:t>Target: Mortality rate (per 1000 live births).</a:t>
+            </a:r>
+          </a:p>
+          <a:p>
+            <a:r>
+              <a:rPr dirty="0"/>
+              <a:t>Preprocessing: Encoding categorical data, normalizing numerical features.</a:t>
+            </a:r>
+          </a:p>
+        </p:txBody>
+      </p:sp>
+    </p:spTree>
+  </p:cSld>
+  <p:clrMapOvr>
+    <a:masterClrMapping/>
+  </p:clrMapOvr>
+</p:sld>
+</file>
+
+<file path=ppt/slides/slide6.xml><?xml version="1.0" encoding="utf-8"?>
+<p:sld xmlns:a="http://schemas.openxmlformats.org/drawingml/2006/main" xmlns:r="http://schemas.openxmlformats.org/officeDocument/2006/relationships" xmlns:p="http://schemas.openxmlformats.org/presentationml/2006/main">
+  <p:cSld>
+    <p:spTree>
+      <p:nvGrpSpPr>
+        <p:cNvPr id="1" name=""/>
+        <p:cNvGrpSpPr/>
+        <p:nvPr/>
+      </p:nvGrpSpPr>
+      <p:grpSpPr>
+        <a:xfrm>
+          <a:off x="0" y="0"/>
+          <a:ext cx="0" cy="0"/>
+          <a:chOff x="0" y="0"/>
+          <a:chExt cx="0" cy="0"/>
+        </a:xfrm>
+      </p:grpSpPr>
+      <p:sp>
+        <p:nvSpPr>
+          <p:cNvPr id="2" name="Title 1">
+            <a:extLst>
+              <a:ext uri="{FF2B5EF4-FFF2-40B4-BE49-F238E27FC236}">
+                <a16:creationId xmlns:a16="http://schemas.microsoft.com/office/drawing/2014/main" id="{7C06E619-80E9-725C-1583-FFDE7E783209}"/>
+              </a:ext>
+            </a:extLst>
+          </p:cNvPr>
+          <p:cNvSpPr>
+            <a:spLocks noGrp="1"/>
+          </p:cNvSpPr>
+          <p:nvPr>
+            <p:ph type="title"/>
+          </p:nvPr>
+        </p:nvSpPr>
+        <p:spPr/>
+        <p:txBody>
+          <a:bodyPr/>
+          <a:lstStyle/>
+          <a:p>
+            <a:r>
+              <a:rPr lang="en-US" dirty="0"/>
+              <a:t>Methodology</a:t>
+            </a:r>
+          </a:p>
+        </p:txBody>
+      </p:sp>
+      <p:sp>
+        <p:nvSpPr>
+          <p:cNvPr id="3" name="Content Placeholder 2">
+            <a:extLst>
+              <a:ext uri="{FF2B5EF4-FFF2-40B4-BE49-F238E27FC236}">
+                <a16:creationId xmlns:a16="http://schemas.microsoft.com/office/drawing/2014/main" id="{A334170B-BEE1-D1D5-C709-8F90609BC8FF}"/>
+              </a:ext>
+            </a:extLst>
+          </p:cNvPr>
+          <p:cNvSpPr>
+            <a:spLocks noGrp="1"/>
+          </p:cNvSpPr>
+          <p:nvPr>
+            <p:ph idx="1"/>
+          </p:nvPr>
+        </p:nvSpPr>
+        <p:spPr/>
+        <p:txBody>
+          <a:bodyPr/>
+          <a:lstStyle/>
+          <a:p>
+            <a:pPr marL="0" indent="0">
+              <a:buNone/>
+            </a:pPr>
+            <a:r>
+              <a:rPr lang="en-US" sz="2800" b="1" dirty="0"/>
+              <a:t>Steps:</a:t>
+            </a:r>
+          </a:p>
+          <a:p>
+            <a:pPr marL="0" indent="0">
+              <a:buNone/>
+            </a:pPr>
+            <a:r>
+              <a:rPr lang="en-US" sz="2000" dirty="0"/>
+              <a:t>1. Data Cleaning: Handling missing values and encoding.</a:t>
+            </a:r>
+          </a:p>
+          <a:p>
+            <a:pPr marL="0" indent="0">
+              <a:buNone/>
+            </a:pPr>
+            <a:r>
+              <a:rPr lang="en-US" sz="2000" dirty="0"/>
+              <a:t>2. Splitting Dataset: 80% training, 20% testing.</a:t>
+            </a:r>
+          </a:p>
+          <a:p>
+            <a:pPr marL="0" indent="0">
+              <a:buNone/>
+            </a:pPr>
+            <a:r>
+              <a:rPr lang="en-US" sz="2000" dirty="0"/>
+              <a:t>3. Applying Models: Linear Regression, Decision Tree, Random Forest, K Neighbors.</a:t>
+            </a:r>
+          </a:p>
+          <a:p>
+            <a:pPr marL="0" indent="0">
+              <a:buNone/>
+            </a:pPr>
+            <a:r>
+              <a:rPr lang="en-US" sz="2000" dirty="0"/>
+              <a:t>4. Evaluation: Using MSE and MAE to compare performance.</a:t>
+            </a:r>
+          </a:p>
+        </p:txBody>
+      </p:sp>
+    </p:spTree>
+    <p:extLst>
+      <p:ext uri="{BB962C8B-B14F-4D97-AF65-F5344CB8AC3E}">
+        <p14:creationId xmlns:p14="http://schemas.microsoft.com/office/powerpoint/2010/main" val="2129099590"/>
+      </p:ext>
+    </p:extLst>
+  </p:cSld>
+  <p:clrMapOvr>
+    <a:masterClrMapping/>
+  </p:clrMapOvr>
+</p:sld>
+</file>
+
+<file path=ppt/slides/slide7.xml><?xml version="1.0" encoding="utf-8"?>
+<p:sld xmlns:a="http://schemas.openxmlformats.org/drawingml/2006/main" xmlns:r="http://schemas.openxmlformats.org/officeDocument/2006/relationships" xmlns:p="http://schemas.openxmlformats.org/presentationml/2006/main">
+  <p:cSld>
+    <p:spTree>
+      <p:nvGrpSpPr>
+        <p:cNvPr id="1" name=""/>
+        <p:cNvGrpSpPr/>
+        <p:nvPr/>
+      </p:nvGrpSpPr>
+      <p:grpSpPr>
+        <a:xfrm>
+          <a:off x="0" y="0"/>
+          <a:ext cx="0" cy="0"/>
+          <a:chOff x="0" y="0"/>
+          <a:chExt cx="0" cy="0"/>
+        </a:xfrm>
+      </p:grpSpPr>
+      <p:sp>
+        <p:nvSpPr>
+          <p:cNvPr id="2" name="Title 1">
+            <a:extLst>
+              <a:ext uri="{FF2B5EF4-FFF2-40B4-BE49-F238E27FC236}">
+                <a16:creationId xmlns:a16="http://schemas.microsoft.com/office/drawing/2014/main" id="{32CB2927-4021-D169-3B57-2513A3303E4F}"/>
+              </a:ext>
+            </a:extLst>
+          </p:cNvPr>
+          <p:cNvSpPr>
+            <a:spLocks noGrp="1"/>
+          </p:cNvSpPr>
+          <p:nvPr>
+            <p:ph type="title"/>
+          </p:nvPr>
+        </p:nvSpPr>
+        <p:spPr/>
+        <p:txBody>
+          <a:bodyPr/>
+          <a:lstStyle/>
+          <a:p>
+            <a:r>
+              <a:rPr lang="en-US" dirty="0"/>
+              <a:t>Data Visualization</a:t>
+            </a:r>
+          </a:p>
+        </p:txBody>
+      </p:sp>
+      <p:pic>
+        <p:nvPicPr>
+          <p:cNvPr id="1026" name="Picture 2">
+            <a:extLst>
+              <a:ext uri="{FF2B5EF4-FFF2-40B4-BE49-F238E27FC236}">
+                <a16:creationId xmlns:a16="http://schemas.microsoft.com/office/drawing/2014/main" id="{D663D2E3-BD77-3402-2EBC-5782C8E3F709}"/>
+              </a:ext>
+            </a:extLst>
+          </p:cNvPr>
+          <p:cNvPicPr>
+            <a:picLocks noGrp="1" noChangeAspect="1" noChangeArrowheads="1"/>
+          </p:cNvPicPr>
+          <p:nvPr>
+            <p:ph idx="1"/>
+          </p:nvPr>
+        </p:nvPicPr>
+        <p:blipFill>
+          <a:blip r:embed="rId2">
+            <a:extLst>
+              <a:ext uri="{28A0092B-C50C-407E-A947-70E740481C1C}">
+                <a14:useLocalDpi xmlns:a14="http://schemas.microsoft.com/office/drawing/2010/main" val="0"/>
+              </a:ext>
+            </a:extLst>
+          </a:blip>
+          <a:srcRect/>
+          <a:stretch>
+            <a:fillRect/>
+          </a:stretch>
+        </p:blipFill>
+        <p:spPr bwMode="auto">
+          <a:xfrm>
+            <a:off x="1180390" y="2336800"/>
+            <a:ext cx="5594182" cy="3598863"/>
+          </a:xfrm>
+          <a:prstGeom prst="rect">
+            <a:avLst/>
+          </a:prstGeom>
+          <a:noFill/>
+          <a:extLst>
+            <a:ext uri="{909E8E84-426E-40DD-AFC4-6F175D3DCCD1}">
+              <a14:hiddenFill xmlns:a14="http://schemas.microsoft.com/office/drawing/2010/main">
+                <a:solidFill>
+                  <a:srgbClr val="FFFFFF"/>
+                </a:solidFill>
+              </a14:hiddenFill>
+            </a:ext>
+          </a:extLst>
+        </p:spPr>
+      </p:pic>
+    </p:spTree>
+    <p:extLst>
+      <p:ext uri="{BB962C8B-B14F-4D97-AF65-F5344CB8AC3E}">
+        <p14:creationId xmlns:p14="http://schemas.microsoft.com/office/powerpoint/2010/main" val="195650462"/>
+      </p:ext>
+    </p:extLst>
+  </p:cSld>
+  <p:clrMapOvr>
+    <a:masterClrMapping/>
+  </p:clrMapOvr>
+</p:sld>
+</file>
+
+<file path=ppt/slides/slide8.xml><?xml version="1.0" encoding="utf-8"?>
+<p:sld xmlns:a="http://schemas.openxmlformats.org/drawingml/2006/main" xmlns:r="http://schemas.openxmlformats.org/officeDocument/2006/relationships" xmlns:p="http://schemas.openxmlformats.org/presentationml/2006/main">
+  <p:cSld>
+    <p:spTree>
+      <p:nvGrpSpPr>
+        <p:cNvPr id="1" name=""/>
+        <p:cNvGrpSpPr/>
+        <p:nvPr/>
+      </p:nvGrpSpPr>
+      <p:grpSpPr>
+        <a:xfrm>
+          <a:off x="0" y="0"/>
+          <a:ext cx="0" cy="0"/>
+          <a:chOff x="0" y="0"/>
+          <a:chExt cx="0" cy="0"/>
+        </a:xfrm>
+      </p:grpSpPr>
+      <p:sp>
+        <p:nvSpPr>
+          <p:cNvPr id="2" name="Title 1"/>
+          <p:cNvSpPr>
+            <a:spLocks noGrp="1"/>
+          </p:cNvSpPr>
+          <p:nvPr>
+            <p:ph type="title"/>
+          </p:nvPr>
+        </p:nvSpPr>
+        <p:spPr/>
+        <p:txBody>
+          <a:bodyPr/>
+          <a:lstStyle/>
+          <a:p>
+            <a:r>
+              <a:t>Results</a:t>
+            </a:r>
+          </a:p>
+        </p:txBody>
+      </p:sp>
+      <p:sp>
+        <p:nvSpPr>
+          <p:cNvPr id="3" name="Content Placeholder 2"/>
+          <p:cNvSpPr>
+            <a:spLocks noGrp="1"/>
+          </p:cNvSpPr>
+          <p:nvPr>
+            <p:ph idx="1"/>
+          </p:nvPr>
+        </p:nvSpPr>
+        <p:spPr/>
+        <p:txBody>
+          <a:bodyPr/>
+          <a:lstStyle/>
+          <a:p>
+            <a:pPr marL="0" indent="0">
+              <a:buNone/>
+            </a:pPr>
+            <a:r>
+              <a:rPr sz="2800" b="1" dirty="0"/>
+              <a:t>Model Performance (MAE):</a:t>
+            </a:r>
+          </a:p>
+          <a:p>
+            <a:r>
+              <a:rPr sz="2000" dirty="0"/>
+              <a:t>Linear Regression: 2137.19</a:t>
+            </a:r>
+          </a:p>
+          <a:p>
+            <a:r>
+              <a:rPr sz="2000" dirty="0"/>
+              <a:t>Random Forest: 182.01</a:t>
+            </a:r>
+          </a:p>
+          <a:p>
+            <a:r>
+              <a:rPr sz="2000" dirty="0"/>
+              <a:t>Decision Tree: 226.76</a:t>
+            </a:r>
+          </a:p>
+          <a:p>
+            <a:r>
+              <a:rPr sz="2000" dirty="0"/>
+              <a:t>K Neighbors: 211.85</a:t>
+            </a:r>
+            <a:endParaRPr lang="en-US" sz="2000" dirty="0"/>
+          </a:p>
+          <a:p>
+            <a:pPr marL="0" indent="0">
+              <a:buNone/>
+            </a:pPr>
+            <a:endParaRPr dirty="0"/>
+          </a:p>
+          <a:p>
+            <a:pPr marL="0" indent="0">
+              <a:buNone/>
+            </a:pPr>
+            <a:r>
+              <a:rPr lang="en-US" dirty="0"/>
+              <a:t>=&gt; </a:t>
+            </a:r>
+            <a:r>
+              <a:rPr dirty="0"/>
+              <a:t>Random Forest performed the best.</a:t>
+            </a:r>
+          </a:p>
+        </p:txBody>
+      </p:sp>
+    </p:spTree>
+  </p:cSld>
+  <p:clrMapOvr>
+    <a:masterClrMapping/>
+  </p:clrMapOvr>
+</p:sld>
+</file>
+
+<file path=ppt/slides/slide9.xml><?xml version="1.0" encoding="utf-8"?>
+<p:sld xmlns:a="http://schemas.openxmlformats.org/drawingml/2006/main" xmlns:r="http://schemas.openxmlformats.org/officeDocument/2006/relationships" xmlns:p="http://schemas.openxmlformats.org/presentationml/2006/main">
+  <p:cSld>
+    <p:spTree>
+      <p:nvGrpSpPr>
+        <p:cNvPr id="1" name=""/>
+        <p:cNvGrpSpPr/>
+        <p:nvPr/>
+      </p:nvGrpSpPr>
+      <p:grpSpPr>
+        <a:xfrm>
+          <a:off x="0" y="0"/>
+          <a:ext cx="0" cy="0"/>
+          <a:chOff x="0" y="0"/>
+          <a:chExt cx="0" cy="0"/>
+        </a:xfrm>
+      </p:grpSpPr>
+      <p:sp>
+        <p:nvSpPr>
+          <p:cNvPr id="2" name="Title 1"/>
+          <p:cNvSpPr>
+            <a:spLocks noGrp="1"/>
+          </p:cNvSpPr>
+          <p:nvPr>
+            <p:ph type="title"/>
+          </p:nvPr>
+        </p:nvSpPr>
+        <p:spPr/>
+        <p:txBody>
+          <a:bodyPr/>
+          <a:lstStyle/>
+          <a:p>
+            <a:r>
+              <a:t>Conclusion</a:t>
+            </a:r>
+          </a:p>
+        </p:txBody>
+      </p:sp>
+      <p:sp>
+        <p:nvSpPr>
+          <p:cNvPr id="3" name="Content Placeholder 2"/>
+          <p:cNvSpPr>
+            <a:spLocks noGrp="1"/>
+          </p:cNvSpPr>
+          <p:nvPr>
+            <p:ph idx="1"/>
+          </p:nvPr>
+        </p:nvSpPr>
+        <p:spPr/>
+        <p:txBody>
+          <a:bodyPr>
+            <a:normAutofit/>
+          </a:bodyPr>
+          <a:lstStyle/>
+          <a:p>
+            <a:r>
+              <a:rPr dirty="0"/>
+              <a:t>Random Forest is the most effective model with the lowest error.</a:t>
+            </a:r>
+          </a:p>
+          <a:p>
+            <a:r>
+              <a:rPr dirty="0"/>
+              <a:t>Neonatal deaths are the primary contributors to under-five mortality.</a:t>
+            </a:r>
+          </a:p>
+          <a:p>
+            <a:r>
+              <a:rPr dirty="0"/>
+              <a:t>Future Work:</a:t>
+            </a:r>
+          </a:p>
+          <a:p>
+            <a:pPr marL="914400" lvl="1" indent="-457200">
+              <a:buFont typeface="+mj-lt"/>
+              <a:buAutoNum type="arabicPeriod"/>
+            </a:pPr>
+            <a:r>
+              <a:rPr dirty="0"/>
+              <a:t>Add more features like healthcare access and education.</a:t>
+            </a:r>
+            <a:endParaRPr lang="en-US" dirty="0"/>
+          </a:p>
+          <a:p>
+            <a:pPr marL="914400" lvl="1" indent="-457200">
+              <a:buFont typeface="+mj-lt"/>
+              <a:buAutoNum type="arabicPeriod"/>
+            </a:pPr>
+            <a:r>
+              <a:rPr dirty="0"/>
+              <a:t>Explore deep learning techniques for further improvement.</a:t>
+            </a:r>
+          </a:p>
+        </p:txBody>
+      </p:sp>
+    </p:spTree>
   </p:cSld>
   <p:clrMapOvr>
     <a:masterClrMapping/>

</xml_diff>